<commit_message>
Another update to later slide.
</commit_message>
<xml_diff>
--- a/BDD and SpecFlow.pptx
+++ b/BDD and SpecFlow.pptx
@@ -6131,9 +6131,6 @@
               </a:rPr>
               <a:t>10/6/2010</a:t>
             </a:r>
-            <a:endParaRPr lang="en-US" sz="2400" dirty="0" smtClean="0">
-              <a:latin typeface="+mn-lt"/>
-            </a:endParaRPr>
           </a:p>
           <a:p>
             <a:endParaRPr lang="en-US" sz="2400" dirty="0">
@@ -6781,19 +6778,7 @@
           <a:p>
             <a:r>
               <a:rPr lang="en-US" sz="4000" dirty="0" smtClean="0"/>
-              <a:t>BDD </a:t>
-            </a:r>
-            <a:r>
-              <a:rPr lang="en-US" sz="4000" dirty="0" smtClean="0"/>
-              <a:t>is still </a:t>
-            </a:r>
-            <a:r>
-              <a:rPr lang="en-US" sz="4000" dirty="0" smtClean="0"/>
-              <a:t>TDD, </a:t>
-            </a:r>
-            <a:r>
-              <a:rPr lang="en-US" sz="4000" dirty="0" smtClean="0"/>
-              <a:t>but with a focus on the business requirements.</a:t>
+              <a:t>BDD is still TDD, but with a focus on the business requirements.</a:t>
             </a:r>
           </a:p>
           <a:p>
@@ -6807,7 +6792,6 @@
               <a:rPr lang="en-US" sz="4000" dirty="0" smtClean="0"/>
               <a:t>Most of the best unit testing practices still apply to BDD.</a:t>
             </a:r>
-            <a:endParaRPr lang="en-US" sz="4000" dirty="0" smtClean="0"/>
           </a:p>
         </p:txBody>
       </p:sp>
@@ -7105,7 +7089,7 @@
         <p:spPr/>
         <p:txBody>
           <a:bodyPr>
-            <a:normAutofit/>
+            <a:normAutofit fontScale="92500" lnSpcReduction="10000"/>
           </a:bodyPr>
           <a:lstStyle/>
           <a:p>
@@ -7117,15 +7101,29 @@
           <a:p>
             <a:r>
               <a:rPr lang="en-US" sz="4000" dirty="0" smtClean="0"/>
-              <a:t>It’s hard to go wrong with TDD, but when BDD is a better fit, use it.</a:t>
-            </a:r>
+              <a:t>It’s hard to go wrong with TDD, but when BDD is a better fit, use it</a:t>
+            </a:r>
+            <a:r>
+              <a:rPr lang="en-US" sz="4000" dirty="0" smtClean="0"/>
+              <a:t>.</a:t>
+            </a:r>
+          </a:p>
+          <a:p>
+            <a:r>
+              <a:rPr lang="en-US" sz="4000" dirty="0" smtClean="0"/>
+              <a:t>Your code-only tests aren’t as easy to read as </a:t>
+            </a:r>
+            <a:r>
+              <a:rPr lang="en-US" sz="4000" smtClean="0"/>
+              <a:t>you think.</a:t>
+            </a:r>
+            <a:endParaRPr lang="en-US" sz="4000" dirty="0" smtClean="0"/>
           </a:p>
           <a:p>
             <a:r>
               <a:rPr lang="en-US" sz="4000" dirty="0" smtClean="0"/>
               <a:t>No matter what you do, test.</a:t>
             </a:r>
-            <a:endParaRPr lang="en-US" sz="4000" dirty="0" smtClean="0"/>
           </a:p>
         </p:txBody>
       </p:sp>
@@ -7336,6 +7334,67 @@
                       </p:childTnLst>
                     </p:cTn>
                   </p:par>
+                  <p:par>
+                    <p:cTn id="18" fill="hold">
+                      <p:stCondLst>
+                        <p:cond delay="indefinite"/>
+                      </p:stCondLst>
+                      <p:childTnLst>
+                        <p:par>
+                          <p:cTn id="19" fill="hold">
+                            <p:stCondLst>
+                              <p:cond delay="0"/>
+                            </p:stCondLst>
+                            <p:childTnLst>
+                              <p:par>
+                                <p:cTn id="20" presetID="10" presetClass="entr" presetSubtype="0" fill="hold" grpId="0" nodeType="clickEffect">
+                                  <p:stCondLst>
+                                    <p:cond delay="0"/>
+                                  </p:stCondLst>
+                                  <p:childTnLst>
+                                    <p:set>
+                                      <p:cBhvr>
+                                        <p:cTn id="21" dur="1" fill="hold">
+                                          <p:stCondLst>
+                                            <p:cond delay="0"/>
+                                          </p:stCondLst>
+                                        </p:cTn>
+                                        <p:tgtEl>
+                                          <p:spTgt spid="5">
+                                            <p:txEl>
+                                              <p:pRg st="3" end="3"/>
+                                            </p:txEl>
+                                          </p:spTgt>
+                                        </p:tgtEl>
+                                        <p:attrNameLst>
+                                          <p:attrName>style.visibility</p:attrName>
+                                        </p:attrNameLst>
+                                      </p:cBhvr>
+                                      <p:to>
+                                        <p:strVal val="visible"/>
+                                      </p:to>
+                                    </p:set>
+                                    <p:animEffect transition="in" filter="fade">
+                                      <p:cBhvr>
+                                        <p:cTn id="22" dur="500"/>
+                                        <p:tgtEl>
+                                          <p:spTgt spid="5">
+                                            <p:txEl>
+                                              <p:pRg st="3" end="3"/>
+                                            </p:txEl>
+                                          </p:spTgt>
+                                        </p:tgtEl>
+                                      </p:cBhvr>
+                                    </p:animEffect>
+                                  </p:childTnLst>
+                                </p:cTn>
+                              </p:par>
+                            </p:childTnLst>
+                          </p:cTn>
+                        </p:par>
+                      </p:childTnLst>
+                    </p:cTn>
+                  </p:par>
                 </p:childTnLst>
               </p:cTn>
               <p:prevCondLst>
@@ -7443,7 +7502,6 @@
               <a:rPr lang="en-US" sz="4000" dirty="0" smtClean="0"/>
               <a:t>Software that can be explained.</a:t>
             </a:r>
-            <a:endParaRPr lang="en-US" sz="4000" dirty="0" smtClean="0"/>
           </a:p>
           <a:p>
             <a:r>
@@ -9284,14 +9342,12 @@
               <a:rPr lang="en-US" dirty="0" smtClean="0"/>
               <a:t>Feature – What does your app do?</a:t>
             </a:r>
-            <a:endParaRPr lang="en-US" dirty="0" smtClean="0"/>
           </a:p>
           <a:p>
             <a:r>
               <a:rPr lang="en-US" dirty="0" smtClean="0"/>
               <a:t>Scenario – Given [X] context, what should occur?</a:t>
             </a:r>
-            <a:endParaRPr lang="en-US" dirty="0" smtClean="0"/>
           </a:p>
           <a:p>
             <a:r>
@@ -9304,7 +9360,6 @@
               <a:rPr lang="en-US" dirty="0" smtClean="0"/>
               <a:t>Step Definitions – The binding between your Steps to what they mean in code.</a:t>
             </a:r>
-            <a:endParaRPr lang="en-US" dirty="0" smtClean="0"/>
           </a:p>
         </p:txBody>
       </p:sp>
@@ -9765,11 +9820,7 @@
           <a:p>
             <a:r>
               <a:rPr lang="en-US" dirty="0" smtClean="0"/>
-              <a:t>BDD </a:t>
-            </a:r>
-            <a:r>
-              <a:rPr lang="en-US" dirty="0" smtClean="0"/>
-              <a:t>Explained (</a:t>
+              <a:t>BDD Explained (</a:t>
             </a:r>
             <a:r>
               <a:rPr lang="en-US" dirty="0" err="1" smtClean="0"/>
@@ -9813,7 +9864,6 @@
               <a:rPr lang="en-US" sz="3600" dirty="0" smtClean="0"/>
               <a:t>Focus is on the behavior of the system, not individual classes.</a:t>
             </a:r>
-            <a:endParaRPr lang="en-US" sz="3600" dirty="0" smtClean="0"/>
           </a:p>
           <a:p>
             <a:r>
@@ -10212,11 +10262,7 @@
           <a:p>
             <a:r>
               <a:rPr lang="en-US" dirty="0" smtClean="0"/>
-              <a:t>Yello</a:t>
-            </a:r>
-            <a:r>
-              <a:rPr lang="en-US" dirty="0" smtClean="0"/>
-              <a:t>w</a:t>
+              <a:t>Yellow</a:t>
             </a:r>
           </a:p>
           <a:p>

</xml_diff>

<commit_message>
Start on the outside-in presentation.
</commit_message>
<xml_diff>
--- a/BDD and SpecFlow.pptx
+++ b/BDD and SpecFlow.pptx
@@ -239,7 +239,7 @@
             <a:fld id="{D83FDC75-7F73-4A4A-A77C-09AADF00E0EA}" type="datetimeFigureOut">
               <a:rPr lang="en-US" smtClean="0"/>
               <a:pPr/>
-              <a:t>11/2/2010</a:t>
+              <a:t>11/3/2010</a:t>
             </a:fld>
             <a:endParaRPr lang="en-US" dirty="0"/>
           </a:p>
@@ -406,7 +406,7 @@
             <a:fld id="{48AEF76B-3757-4A0B-AF93-28494465C1DD}" type="datetimeFigureOut">
               <a:rPr lang="en-US" smtClean="0"/>
               <a:pPr/>
-              <a:t>11/2/2010</a:t>
+              <a:t>11/3/2010</a:t>
             </a:fld>
             <a:endParaRPr lang="en-US" dirty="0"/>
           </a:p>
@@ -2942,7 +2942,7 @@
             <a:fld id="{757B281C-5159-4971-8228-52B9A72E9ED2}" type="datetimeFigureOut">
               <a:rPr lang="en-US" smtClean="0"/>
               <a:pPr/>
-              <a:t>11/2/2010</a:t>
+              <a:t>11/3/2010</a:t>
             </a:fld>
             <a:endParaRPr lang="en-US" dirty="0"/>
           </a:p>
@@ -3044,7 +3044,7 @@
             <a:fld id="{757B281C-5159-4971-8228-52B9A72E9ED2}" type="datetimeFigureOut">
               <a:rPr lang="en-US" smtClean="0"/>
               <a:pPr/>
-              <a:t>11/2/2010</a:t>
+              <a:t>11/3/2010</a:t>
             </a:fld>
             <a:endParaRPr lang="en-US" dirty="0"/>
           </a:p>
@@ -3180,7 +3180,7 @@
             <a:fld id="{757B281C-5159-4971-8228-52B9A72E9ED2}" type="datetimeFigureOut">
               <a:rPr lang="en-US" smtClean="0"/>
               <a:pPr/>
-              <a:t>11/2/2010</a:t>
+              <a:t>11/3/2010</a:t>
             </a:fld>
             <a:endParaRPr lang="en-US" dirty="0"/>
           </a:p>
@@ -3386,7 +3386,7 @@
             <a:fld id="{757B281C-5159-4971-8228-52B9A72E9ED2}" type="datetimeFigureOut">
               <a:rPr lang="en-US" smtClean="0"/>
               <a:pPr/>
-              <a:t>11/2/2010</a:t>
+              <a:t>11/3/2010</a:t>
             </a:fld>
             <a:endParaRPr lang="en-US" dirty="0"/>
           </a:p>
@@ -3785,7 +3785,7 @@
             <a:fld id="{757B281C-5159-4971-8228-52B9A72E9ED2}" type="datetimeFigureOut">
               <a:rPr lang="en-US" smtClean="0"/>
               <a:pPr/>
-              <a:t>11/2/2010</a:t>
+              <a:t>11/3/2010</a:t>
             </a:fld>
             <a:endParaRPr lang="en-US" dirty="0"/>
           </a:p>
@@ -4085,7 +4085,7 @@
             <a:fld id="{757B281C-5159-4971-8228-52B9A72E9ED2}" type="datetimeFigureOut">
               <a:rPr lang="en-US" smtClean="0"/>
               <a:pPr/>
-              <a:t>11/2/2010</a:t>
+              <a:t>11/3/2010</a:t>
             </a:fld>
             <a:endParaRPr lang="en-US" dirty="0"/>
           </a:p>
@@ -4514,7 +4514,7 @@
             <a:fld id="{757B281C-5159-4971-8228-52B9A72E9ED2}" type="datetimeFigureOut">
               <a:rPr lang="en-US" smtClean="0"/>
               <a:pPr/>
-              <a:t>11/2/2010</a:t>
+              <a:t>11/3/2010</a:t>
             </a:fld>
             <a:endParaRPr lang="en-US" dirty="0"/>
           </a:p>
@@ -4791,7 +4791,7 @@
             <a:fld id="{757B281C-5159-4971-8228-52B9A72E9ED2}" type="datetimeFigureOut">
               <a:rPr lang="en-US" smtClean="0"/>
               <a:pPr/>
-              <a:t>11/2/2010</a:t>
+              <a:t>11/3/2010</a:t>
             </a:fld>
             <a:endParaRPr lang="en-US" dirty="0"/>
           </a:p>
@@ -5055,7 +5055,7 @@
             <a:fld id="{757B281C-5159-4971-8228-52B9A72E9ED2}" type="datetimeFigureOut">
               <a:rPr lang="en-US" smtClean="0"/>
               <a:pPr/>
-              <a:t>11/2/2010</a:t>
+              <a:t>11/3/2010</a:t>
             </a:fld>
             <a:endParaRPr lang="en-US" dirty="0"/>
           </a:p>
@@ -5225,7 +5225,7 @@
             <a:fld id="{757B281C-5159-4971-8228-52B9A72E9ED2}" type="datetimeFigureOut">
               <a:rPr lang="en-US" smtClean="0"/>
               <a:pPr/>
-              <a:t>11/2/2010</a:t>
+              <a:t>11/3/2010</a:t>
             </a:fld>
             <a:endParaRPr lang="en-US" dirty="0"/>
           </a:p>
@@ -5405,7 +5405,7 @@
             <a:fld id="{757B281C-5159-4971-8228-52B9A72E9ED2}" type="datetimeFigureOut">
               <a:rPr lang="en-US" smtClean="0"/>
               <a:pPr/>
-              <a:t>11/2/2010</a:t>
+              <a:t>11/3/2010</a:t>
             </a:fld>
             <a:endParaRPr lang="en-US" dirty="0"/>
           </a:p>
@@ -5647,7 +5647,7 @@
             <a:fld id="{757B281C-5159-4971-8228-52B9A72E9ED2}" type="datetimeFigureOut">
               <a:rPr lang="en-US" smtClean="0"/>
               <a:pPr/>
-              <a:t>11/2/2010</a:t>
+              <a:t>11/3/2010</a:t>
             </a:fld>
             <a:endParaRPr lang="en-US" dirty="0"/>
           </a:p>
@@ -6126,11 +6126,14 @@
           </a:p>
           <a:p>
             <a:r>
-              <a:rPr lang="en-US" sz="2400" dirty="0" smtClean="0">
+              <a:rPr lang="en-US" sz="2400" smtClean="0">
                 <a:latin typeface="+mn-lt"/>
               </a:rPr>
-              <a:t>10/6/2010</a:t>
-            </a:r>
+              <a:t>11/6/2010</a:t>
+            </a:r>
+            <a:endParaRPr lang="en-US" sz="2400" dirty="0" smtClean="0">
+              <a:latin typeface="+mn-lt"/>
+            </a:endParaRPr>
           </a:p>
           <a:p>
             <a:endParaRPr lang="en-US" sz="2400" dirty="0">
@@ -7101,11 +7104,7 @@
           <a:p>
             <a:r>
               <a:rPr lang="en-US" sz="4000" dirty="0" smtClean="0"/>
-              <a:t>It’s hard to go wrong with TDD, but when BDD is a better fit, use it</a:t>
-            </a:r>
-            <a:r>
-              <a:rPr lang="en-US" sz="4000" dirty="0" smtClean="0"/>
-              <a:t>.</a:t>
+              <a:t>It’s hard to go wrong with TDD, but when BDD is a better fit, use it.</a:t>
             </a:r>
           </a:p>
           <a:p>

</xml_diff>